<commit_message>
correcao do assembly info
</commit_message>
<xml_diff>
--- a/Curso Fundamentos/ppt/Fundamentos em Arquitetura de Software com C# - Modulo 2.pptx
+++ b/Curso Fundamentos/ppt/Fundamentos em Arquitetura de Software com C# - Modulo 2.pptx
@@ -2848,7 +2848,7 @@
           <a:p>
             <a:fld id="{ED95D740-6A7E-4AE4-809A-1783B6BB9E99}" type="datetimeFigureOut">
               <a:rPr lang="pt-BR" smtClean="0"/>
-              <a:t>01/10/2014</a:t>
+              <a:t>12/11/2014</a:t>
             </a:fld>
             <a:endParaRPr lang="pt-BR" dirty="0"/>
           </a:p>
@@ -2929,6 +2929,43 @@
   </p:cSld>
   <p:clrMap bg1="lt1" tx1="dk1" bg2="lt2" tx2="dk2" accent1="accent1" accent2="accent2" accent3="accent3" accent4="accent4" accent5="accent5" accent6="accent6" hlink="hlink" folHlink="folHlink"/>
 </p:handoutMaster>
+</file>
+
+<file path=ppt/ink/ink1.xml><?xml version="1.0" encoding="utf-8"?>
+<inkml:ink xmlns:inkml="http://www.w3.org/2003/InkML">
+  <inkml:definitions>
+    <inkml:context xml:id="ctx0">
+      <inkml:inkSource xml:id="inkSrc0">
+        <inkml:traceFormat>
+          <inkml:channel name="X" type="integer" max="10690" units="cm"/>
+          <inkml:channel name="Y" type="integer" max="6680" units="cm"/>
+          <inkml:channel name="F" type="integer" max="511" units="dev"/>
+          <inkml:channel name="T" type="integer" max="2.14748E9" units="dev"/>
+        </inkml:traceFormat>
+        <inkml:channelProperties>
+          <inkml:channelProperty channel="X" name="resolution" value="929.56525" units="1/cm"/>
+          <inkml:channelProperty channel="Y" name="resolution" value="927.77777" units="1/cm"/>
+          <inkml:channelProperty channel="F" name="resolution" value="7.09722E-5" units="1/dev"/>
+          <inkml:channelProperty channel="T" name="resolution" value="1" units="1/dev"/>
+        </inkml:channelProperties>
+      </inkml:inkSource>
+      <inkml:timestamp xml:id="ts0" timeString="2014-11-12T23:11:15.848"/>
+    </inkml:context>
+    <inkml:brush xml:id="br0">
+      <inkml:brushProperty name="width" value="0.05292" units="cm"/>
+      <inkml:brushProperty name="height" value="0.05292" units="cm"/>
+      <inkml:brushProperty name="color" value="#FF0000"/>
+    </inkml:brush>
+  </inkml:definitions>
+  <inkml:trace contextRef="#ctx0" brushRef="#br0">28753 7908 104 0,'0'-3'24'15,"-3"3"-6"-15,3-3-2 16,0 3-2-1,57-17 0-15,51 0 1 16,38 0-2 0,41 0-4-16,19 0-5 15,6 5-1-15,-3 10-2 16,-22 4-2 0,-22 7-5-16,-36 2-10 15,-37 4-13 1,-28-7-18-16,-64-8 47 15,0 0-80-15</inkml:trace>
+  <inkml:trace contextRef="#ctx0" brushRef="#br0" timeOffset="479.5706">28978 8572 80 0,'266'0'21'16,"35"0"-1"0,16 0-7-16,10 6-6 15,-11 3-3 1,-31 2 0-16,-44 3-5 16,-44-2-3-1,-55-6-4-15,-142-6 8 16,95-3-42-16</inkml:trace>
+  <inkml:trace contextRef="#ctx0" brushRef="#br0" timeOffset="1136.4826">28833 7378 104 0,'145'0'24'16,"49"-3"2"-16,27-6-9 16,33 6-10-1,15 3-5-15,-9 3-2 16,-32 9-10-1,-41 2-21-15,-57-3-58 16</inkml:trace>
+  <inkml:trace contextRef="#ctx0" brushRef="#br0" timeOffset="1779.1101">29286 9257 91 0,'171'-26'14'0,"19"9"-9"16,9 9-5-16,-9 10-26 16</inkml:trace>
+  <inkml:trace contextRef="#ctx0" brushRef="#br0" timeOffset="2768.0253">28624 12391 81 0,'63'-9'20'16,"32"9"-1"-1,-95 0-19-15,120 9 15 16,36 0 0-16,27-1-4 16,39 1-2-16,38 5-4 15,28-3-2 1,13 1-2 0,13-4-1-16,-4-8-2 15,-6-11-3 1,0-9-4-16,-28-3-6 15,-35-3-7 1,-57 9-12-16</inkml:trace>
+  <inkml:trace contextRef="#ctx0" brushRef="#br0" timeOffset="3439.5639">28931 12967 65 0,'70'23'21'16,"53"-6"0"-1,-123-17-21-15,184 17 16 16,66-8-8-1,54-4-3-15,51-2-3 16,32-3-3-16,12-3 0 16,-3-2-1-1,-19-4-5-15,-41 1-9 16,-61-1-16 0</inkml:trace>
+  <inkml:trace contextRef="#ctx0" brushRef="#br0" timeOffset="4248.5503">28845 13734 90 0,'241'15'21'15,"51"-4"-4"1,50-5-5-16,31-4-5 15,14-4-4-15,0-4-1 16,-10-5-1 0,-13-1-1-16,-32-2 1 15,-31-3 0 1,-53 8-1-16,-43 3-1 16,-52 1-2-1,-49 2-3-15,-31 3-8 16,-73 0-7-1,0 0-46-15</inkml:trace>
+  <inkml:trace contextRef="#ctx0" brushRef="#br0" timeOffset="6368.4373">32124 12659 67 0,'35'74'27'16,"-10"46"-1"-1,-15 34-2-15,-10 23-4 16,-10-3-6-1,-2-14-6-15,-4-26-2 16,6-23-3 0,1-26 0-16,3-19-2 15,-1-23 0 1,7-43 0-16,0 0 0 16,0 0 1-1,0 0-1-15,19-35 1 16,0-19-3-1,7-20 0-15,-26 74 1 16,22-91-5-16,6-12-1 16,4-14 1-16,-10-2 1 15,3-4 3-15,1 6 1 16,-10 9 1 0,-4 19 1-1,4 18-1-15,-9 22 1 16,-7 49 0-1,0 0 1-15,0 0-1 16,0 0 1 0,0-2 1-16,-61-1-1 15,-8 17 3 1,-23 9-1-16,-22 2-2 16,-19-2 1-1,-16-8 0-15,-13-13-1 16,4-10 0-1,158 8-3-15,-155-14 3 16,-4-12-1-16,-9-5-1 16,-12 5 0-16,-17 0 0 15,-2 3 1-15,12 12-1 16,16 0 0 0,28 5-1-16,32 3 1 15,29 3-2 1,22 0 0-16,60 0 0 15,0 0-1 1,0 0 0-16,0 0 1 16,0 0 1-1,-4 0 0-15,1 0 2 16,0 0-1 0,0 0-1-1,-48-6 1-15,1 3-3 16,50 3 2-1,-51 0-1-15,-3-2 0 16,-22 2-2-16,-19 5 1 16,-19 12 1-16,-13 1-1 15,4 7 1 1,15 1 0-16,26-3 1 16,18-1 0-1,20-2 0-15,9-2-1 16,35-18 1-16,-25 20-1 15,25-20 0 1,0 0 1-16,0 0 0 16,0 0 0-1,-23 22 0-15,23-22 1 16,0 0-1 0,0 0 0-16,0 0 1 15,0 0-1-15,-3 3 0 16,0 0-1-16,-25 28 1 15,12 12 0 1,-6 31 4 0,3 49 2-16,-7 34 1 15,7 20-1 1,-3 2-3-16,16-13-2 16,6-24-2-1,6-30 0-15,10-33 0 16,-3-19-1-1,-4-26-2-15,-9-34-1 16,0 0-1 0,0 0 0-16,0 0-1 15,32-20 1-15,-32 20 1 16,38-22 0 0,0 7 3-16,-38 15 2 15,50-14-1-15,20-6 0 16,25 6 1-16,22-6 0 15,20 6 0 1,18-3 1-16,16 5 0 16,13 1 0-1,18 5-1-15,14 3-1 16,6 3 0 0,12 6 0-16,-12 8-3 15,-16 3-13 1,-22 3-9-16,-29 0-20 15</inkml:trace>
+</inkml:ink>
 </file>
 
 <file path=ppt/notesMasters/notesMaster1.xml><?xml version="1.0" encoding="utf-8"?>
@@ -3040,7 +3077,7 @@
               <a:pPr>
                 <a:defRPr/>
               </a:pPr>
-              <a:t>01/10/2014</a:t>
+              <a:t>12/11/2014</a:t>
             </a:fld>
             <a:endParaRPr lang="pt-BR" dirty="0"/>
           </a:p>
@@ -10474,7 +10511,7 @@
               <a:pPr>
                 <a:defRPr/>
               </a:pPr>
-              <a:t>01/10/2014</a:t>
+              <a:t>12/11/2014</a:t>
             </a:fld>
             <a:endParaRPr lang="pt-BR" dirty="0"/>
           </a:p>
@@ -10829,7 +10866,7 @@
               <a:pPr>
                 <a:defRPr/>
               </a:pPr>
-              <a:t>01/10/2014</a:t>
+              <a:t>12/11/2014</a:t>
             </a:fld>
             <a:endParaRPr lang="pt-BR" dirty="0"/>
           </a:p>
@@ -11154,7 +11191,7 @@
               <a:pPr>
                 <a:defRPr/>
               </a:pPr>
-              <a:t>01/10/2014</a:t>
+              <a:t>12/11/2014</a:t>
             </a:fld>
             <a:endParaRPr lang="pt-BR" dirty="0"/>
           </a:p>
@@ -11558,7 +11595,7 @@
               <a:pPr>
                 <a:defRPr/>
               </a:pPr>
-              <a:t>01/10/2014</a:t>
+              <a:t>12/11/2014</a:t>
             </a:fld>
             <a:endParaRPr lang="pt-BR" dirty="0"/>
           </a:p>
@@ -11901,7 +11938,7 @@
               <a:pPr>
                 <a:defRPr/>
               </a:pPr>
-              <a:t>01/10/2014</a:t>
+              <a:t>12/11/2014</a:t>
             </a:fld>
             <a:endParaRPr lang="pt-BR" dirty="0"/>
           </a:p>
@@ -12433,7 +12470,7 @@
               <a:pPr>
                 <a:defRPr/>
               </a:pPr>
-              <a:t>01/10/2014</a:t>
+              <a:t>12/11/2014</a:t>
             </a:fld>
             <a:endParaRPr lang="pt-BR" dirty="0"/>
           </a:p>
@@ -13041,7 +13078,7 @@
               <a:pPr>
                 <a:defRPr/>
               </a:pPr>
-              <a:t>01/10/2014</a:t>
+              <a:t>12/11/2014</a:t>
             </a:fld>
             <a:endParaRPr lang="pt-BR" dirty="0"/>
           </a:p>
@@ -13309,7 +13346,7 @@
               <a:pPr>
                 <a:defRPr/>
               </a:pPr>
-              <a:t>01/10/2014</a:t>
+              <a:t>12/11/2014</a:t>
             </a:fld>
             <a:endParaRPr lang="pt-BR" dirty="0"/>
           </a:p>
@@ -13431,7 +13468,7 @@
               <a:pPr>
                 <a:defRPr/>
               </a:pPr>
-              <a:t>01/10/2014</a:t>
+              <a:t>12/11/2014</a:t>
             </a:fld>
             <a:endParaRPr lang="pt-BR" dirty="0"/>
           </a:p>
@@ -13755,7 +13792,7 @@
               <a:pPr>
                 <a:defRPr/>
               </a:pPr>
-              <a:t>01/10/2014</a:t>
+              <a:t>12/11/2014</a:t>
             </a:fld>
             <a:endParaRPr lang="pt-BR" dirty="0"/>
           </a:p>
@@ -14042,7 +14079,7 @@
               <a:pPr>
                 <a:defRPr/>
               </a:pPr>
-              <a:t>01/10/2014</a:t>
+              <a:t>12/11/2014</a:t>
             </a:fld>
             <a:endParaRPr lang="pt-BR" dirty="0"/>
           </a:p>
@@ -14335,7 +14372,7 @@
               <a:pPr>
                 <a:defRPr/>
               </a:pPr>
-              <a:t>01/10/2014</a:t>
+              <a:t>12/11/2014</a:t>
             </a:fld>
             <a:endParaRPr lang="pt-BR" dirty="0"/>
           </a:p>
@@ -19695,6 +19732,45 @@
           </a:prstGeom>
         </p:spPr>
       </p:pic>
+      <mc:AlternateContent xmlns:mc="http://schemas.openxmlformats.org/markup-compatibility/2006">
+        <mc:Choice xmlns:p14="http://schemas.microsoft.com/office/powerpoint/2010/main" Requires="p14">
+          <p:contentPart p14:bwMode="auto" r:id="rId6">
+            <p14:nvContentPartPr>
+              <p14:cNvPr id="4" name="Tinta 3"/>
+              <p14:cNvContentPartPr/>
+              <p14:nvPr/>
+            </p14:nvContentPartPr>
+            <p14:xfrm>
+              <a:off x="10204200" y="2650680"/>
+              <a:ext cx="1684800" cy="2500200"/>
+            </p14:xfrm>
+          </p:contentPart>
+        </mc:Choice>
+        <mc:Fallback>
+          <p:pic>
+            <p:nvPicPr>
+              <p:cNvPr id="4" name="Tinta 3"/>
+              <p:cNvPicPr/>
+              <p:nvPr/>
+            </p:nvPicPr>
+            <p:blipFill>
+              <a:blip r:embed="rId7"/>
+              <a:stretch>
+                <a:fillRect/>
+              </a:stretch>
+            </p:blipFill>
+            <p:spPr>
+              <a:xfrm>
+                <a:off x="10194480" y="2643120"/>
+                <a:ext cx="1700640" cy="2517120"/>
+              </a:xfrm>
+              <a:prstGeom prst="rect">
+                <a:avLst/>
+              </a:prstGeom>
+            </p:spPr>
+          </p:pic>
+        </mc:Fallback>
+      </mc:AlternateContent>
     </p:spTree>
     <p:extLst>
       <p:ext uri="{BB962C8B-B14F-4D97-AF65-F5344CB8AC3E}">

</xml_diff>